<commit_message>
docs/diagrams: Fix sequence diagram error
</commit_message>
<xml_diff>
--- a/docs/diagrams/LoginSequenceDiagram.pptx
+++ b/docs/diagrams/LoginSequenceDiagram.pptx
@@ -208,7 +208,7 @@
           <a:p>
             <a:fld id="{F5CC4B3F-88C1-4FFA-B1B6-F41C21DC6924}" type="datetimeFigureOut">
               <a:rPr lang="en-US" smtClean="0"/>
-              <a:t>10/24/2018</a:t>
+              <a:t>11/12/2018</a:t>
             </a:fld>
             <a:endParaRPr lang="en-US"/>
           </a:p>
@@ -654,7 +654,7 @@
           <a:p>
             <a:fld id="{78C97017-6FC3-485B-9764-EAC9E56C1D49}" type="datetimeFigureOut">
               <a:rPr lang="en-US" smtClean="0"/>
-              <a:t>10/24/2018</a:t>
+              <a:t>11/12/2018</a:t>
             </a:fld>
             <a:endParaRPr lang="en-US"/>
           </a:p>
@@ -822,7 +822,7 @@
           <a:p>
             <a:fld id="{78C97017-6FC3-485B-9764-EAC9E56C1D49}" type="datetimeFigureOut">
               <a:rPr lang="en-US" smtClean="0"/>
-              <a:t>10/24/2018</a:t>
+              <a:t>11/12/2018</a:t>
             </a:fld>
             <a:endParaRPr lang="en-US"/>
           </a:p>
@@ -1000,7 +1000,7 @@
           <a:p>
             <a:fld id="{78C97017-6FC3-485B-9764-EAC9E56C1D49}" type="datetimeFigureOut">
               <a:rPr lang="en-US" smtClean="0"/>
-              <a:t>10/24/2018</a:t>
+              <a:t>11/12/2018</a:t>
             </a:fld>
             <a:endParaRPr lang="en-US"/>
           </a:p>
@@ -1168,7 +1168,7 @@
           <a:p>
             <a:fld id="{78C97017-6FC3-485B-9764-EAC9E56C1D49}" type="datetimeFigureOut">
               <a:rPr lang="en-US" smtClean="0"/>
-              <a:t>10/24/2018</a:t>
+              <a:t>11/12/2018</a:t>
             </a:fld>
             <a:endParaRPr lang="en-US"/>
           </a:p>
@@ -1413,7 +1413,7 @@
           <a:p>
             <a:fld id="{78C97017-6FC3-485B-9764-EAC9E56C1D49}" type="datetimeFigureOut">
               <a:rPr lang="en-US" smtClean="0"/>
-              <a:t>10/24/2018</a:t>
+              <a:t>11/12/2018</a:t>
             </a:fld>
             <a:endParaRPr lang="en-US"/>
           </a:p>
@@ -1698,7 +1698,7 @@
           <a:p>
             <a:fld id="{78C97017-6FC3-485B-9764-EAC9E56C1D49}" type="datetimeFigureOut">
               <a:rPr lang="en-US" smtClean="0"/>
-              <a:t>10/24/2018</a:t>
+              <a:t>11/12/2018</a:t>
             </a:fld>
             <a:endParaRPr lang="en-US"/>
           </a:p>
@@ -2117,7 +2117,7 @@
           <a:p>
             <a:fld id="{78C97017-6FC3-485B-9764-EAC9E56C1D49}" type="datetimeFigureOut">
               <a:rPr lang="en-US" smtClean="0"/>
-              <a:t>10/24/2018</a:t>
+              <a:t>11/12/2018</a:t>
             </a:fld>
             <a:endParaRPr lang="en-US"/>
           </a:p>
@@ -2234,7 +2234,7 @@
           <a:p>
             <a:fld id="{78C97017-6FC3-485B-9764-EAC9E56C1D49}" type="datetimeFigureOut">
               <a:rPr lang="en-US" smtClean="0"/>
-              <a:t>10/24/2018</a:t>
+              <a:t>11/12/2018</a:t>
             </a:fld>
             <a:endParaRPr lang="en-US"/>
           </a:p>
@@ -2329,7 +2329,7 @@
           <a:p>
             <a:fld id="{78C97017-6FC3-485B-9764-EAC9E56C1D49}" type="datetimeFigureOut">
               <a:rPr lang="en-US" smtClean="0"/>
-              <a:t>10/24/2018</a:t>
+              <a:t>11/12/2018</a:t>
             </a:fld>
             <a:endParaRPr lang="en-US"/>
           </a:p>
@@ -2604,7 +2604,7 @@
           <a:p>
             <a:fld id="{78C97017-6FC3-485B-9764-EAC9E56C1D49}" type="datetimeFigureOut">
               <a:rPr lang="en-US" smtClean="0"/>
-              <a:t>10/24/2018</a:t>
+              <a:t>11/12/2018</a:t>
             </a:fld>
             <a:endParaRPr lang="en-US"/>
           </a:p>
@@ -2856,7 +2856,7 @@
           <a:p>
             <a:fld id="{78C97017-6FC3-485B-9764-EAC9E56C1D49}" type="datetimeFigureOut">
               <a:rPr lang="en-US" smtClean="0"/>
-              <a:t>10/24/2018</a:t>
+              <a:t>11/12/2018</a:t>
             </a:fld>
             <a:endParaRPr lang="en-US"/>
           </a:p>
@@ -3067,7 +3067,7 @@
           <a:p>
             <a:fld id="{78C97017-6FC3-485B-9764-EAC9E56C1D49}" type="datetimeFigureOut">
               <a:rPr lang="en-US" smtClean="0"/>
-              <a:t>10/24/2018</a:t>
+              <a:t>11/12/2018</a:t>
             </a:fld>
             <a:endParaRPr lang="en-US"/>
           </a:p>
@@ -3450,7 +3450,7 @@
         </p:nvSpPr>
         <p:spPr>
           <a:xfrm>
-            <a:off x="6485703" y="105492"/>
+            <a:off x="6462080" y="116942"/>
             <a:ext cx="3762937" cy="6600108"/>
           </a:xfrm>
           <a:prstGeom prst="roundRect">
@@ -5302,8 +5302,8 @@
         </p:nvSpPr>
         <p:spPr>
           <a:xfrm>
-            <a:off x="4334527" y="3871530"/>
-            <a:ext cx="2722534" cy="1689997"/>
+            <a:off x="4334527" y="3871531"/>
+            <a:ext cx="2722534" cy="1251974"/>
           </a:xfrm>
           <a:prstGeom prst="rect">
             <a:avLst/>
@@ -5335,97 +5335,6 @@
           </a:p>
         </p:txBody>
       </p:sp>
-      <p:sp>
-        <p:nvSpPr>
-          <p:cNvPr id="11" name="TextBox 10">
-            <a:extLst>
-              <a:ext uri="{FF2B5EF4-FFF2-40B4-BE49-F238E27FC236}">
-                <a16:creationId xmlns:a16="http://schemas.microsoft.com/office/drawing/2014/main" id="{36443AA4-B944-41D6-8AA1-B376B122E404}"/>
-              </a:ext>
-            </a:extLst>
-          </p:cNvPr>
-          <p:cNvSpPr txBox="1"/>
-          <p:nvPr/>
-        </p:nvSpPr>
-        <p:spPr>
-          <a:xfrm>
-            <a:off x="4334526" y="3882035"/>
-            <a:ext cx="441128" cy="369332"/>
-          </a:xfrm>
-          <a:prstGeom prst="rect">
-            <a:avLst/>
-          </a:prstGeom>
-          <a:noFill/>
-          <a:ln>
-            <a:solidFill>
-              <a:srgbClr val="0070C0"/>
-            </a:solidFill>
-          </a:ln>
-        </p:spPr>
-        <p:txBody>
-          <a:bodyPr wrap="square" rtlCol="0">
-            <a:spAutoFit/>
-          </a:bodyPr>
-          <a:lstStyle/>
-          <a:p>
-            <a:r>
-              <a:rPr lang="en-SG" dirty="0">
-                <a:solidFill>
-                  <a:srgbClr val="0070C0"/>
-                </a:solidFill>
-              </a:rPr>
-              <a:t>alt</a:t>
-            </a:r>
-          </a:p>
-        </p:txBody>
-      </p:sp>
-      <p:cxnSp>
-        <p:nvCxnSpPr>
-          <p:cNvPr id="13" name="Straight Connector 12">
-            <a:extLst>
-              <a:ext uri="{FF2B5EF4-FFF2-40B4-BE49-F238E27FC236}">
-                <a16:creationId xmlns:a16="http://schemas.microsoft.com/office/drawing/2014/main" id="{B5FE67BF-28B4-4761-9521-42E1EF0E3314}"/>
-              </a:ext>
-            </a:extLst>
-          </p:cNvPr>
-          <p:cNvCxnSpPr>
-            <a:cxnSpLocks/>
-          </p:cNvCxnSpPr>
-          <p:nvPr/>
-        </p:nvCxnSpPr>
-        <p:spPr>
-          <a:xfrm>
-            <a:off x="4335755" y="5170427"/>
-            <a:ext cx="2731431" cy="0"/>
-          </a:xfrm>
-          <a:prstGeom prst="line">
-            <a:avLst/>
-          </a:prstGeom>
-          <a:ln w="9525" cap="flat" cmpd="sng" algn="ctr">
-            <a:solidFill>
-              <a:srgbClr val="0070C0"/>
-            </a:solidFill>
-            <a:prstDash val="dash"/>
-            <a:round/>
-            <a:headEnd type="none" w="med" len="med"/>
-            <a:tailEnd type="none" w="med" len="med"/>
-          </a:ln>
-        </p:spPr>
-        <p:style>
-          <a:lnRef idx="0">
-            <a:scrgbClr r="0" g="0" b="0"/>
-          </a:lnRef>
-          <a:fillRef idx="0">
-            <a:scrgbClr r="0" g="0" b="0"/>
-          </a:fillRef>
-          <a:effectRef idx="0">
-            <a:scrgbClr r="0" g="0" b="0"/>
-          </a:effectRef>
-          <a:fontRef idx="minor">
-            <a:schemeClr val="tx1"/>
-          </a:fontRef>
-        </p:style>
-      </p:cxnSp>
       <p:sp>
         <p:nvSpPr>
           <p:cNvPr id="14" name="TextBox 13">
@@ -5440,7 +5349,7 @@
         </p:nvSpPr>
         <p:spPr>
           <a:xfrm>
-            <a:off x="4300123" y="4234838"/>
+            <a:off x="4288489" y="4177332"/>
             <a:ext cx="1164165" cy="307777"/>
           </a:xfrm>
           <a:prstGeom prst="rect">
@@ -5461,44 +5370,6 @@
                 </a:solidFill>
               </a:rPr>
               <a:t>[has account]</a:t>
-            </a:r>
-          </a:p>
-        </p:txBody>
-      </p:sp>
-      <p:sp>
-        <p:nvSpPr>
-          <p:cNvPr id="15" name="Rectangle 14">
-            <a:extLst>
-              <a:ext uri="{FF2B5EF4-FFF2-40B4-BE49-F238E27FC236}">
-                <a16:creationId xmlns:a16="http://schemas.microsoft.com/office/drawing/2014/main" id="{DA8A97D0-05B0-4983-BE26-AD9FC3842662}"/>
-              </a:ext>
-            </a:extLst>
-          </p:cNvPr>
-          <p:cNvSpPr/>
-          <p:nvPr/>
-        </p:nvSpPr>
-        <p:spPr>
-          <a:xfrm>
-            <a:off x="4313586" y="5178623"/>
-            <a:ext cx="585417" cy="307777"/>
-          </a:xfrm>
-          <a:prstGeom prst="rect">
-            <a:avLst/>
-          </a:prstGeom>
-        </p:spPr>
-        <p:txBody>
-          <a:bodyPr wrap="none">
-            <a:spAutoFit/>
-          </a:bodyPr>
-          <a:lstStyle/>
-          <a:p>
-            <a:r>
-              <a:rPr lang="en-SG" sz="1400" dirty="0">
-                <a:solidFill>
-                  <a:srgbClr val="0070C0"/>
-                </a:solidFill>
-              </a:rPr>
-              <a:t>[else]</a:t>
             </a:r>
           </a:p>
         </p:txBody>
@@ -5517,7 +5388,7 @@
         </p:nvSpPr>
         <p:spPr>
           <a:xfrm>
-            <a:off x="5623024" y="3966511"/>
+            <a:off x="5646390" y="3965943"/>
             <a:ext cx="1392439" cy="184666"/>
           </a:xfrm>
           <a:prstGeom prst="rect">
@@ -5828,6 +5699,88 @@
           </a:fontRef>
         </p:style>
       </p:cxnSp>
+      <p:sp>
+        <p:nvSpPr>
+          <p:cNvPr id="3" name="Rectangle: Single Corner Snipped 2">
+            <a:extLst>
+              <a:ext uri="{FF2B5EF4-FFF2-40B4-BE49-F238E27FC236}">
+                <a16:creationId xmlns:a16="http://schemas.microsoft.com/office/drawing/2014/main" id="{C1D44DB4-1DBB-4406-9700-1F669D8FCE71}"/>
+              </a:ext>
+            </a:extLst>
+          </p:cNvPr>
+          <p:cNvSpPr/>
+          <p:nvPr/>
+        </p:nvSpPr>
+        <p:spPr>
+          <a:xfrm flipV="1">
+            <a:off x="4334527" y="3871311"/>
+            <a:ext cx="608782" cy="307221"/>
+          </a:xfrm>
+          <a:prstGeom prst="snip1Rect">
+            <a:avLst/>
+          </a:prstGeom>
+          <a:noFill/>
+        </p:spPr>
+        <p:style>
+          <a:lnRef idx="2">
+            <a:schemeClr val="accent1">
+              <a:shade val="50000"/>
+            </a:schemeClr>
+          </a:lnRef>
+          <a:fillRef idx="1">
+            <a:schemeClr val="accent1"/>
+          </a:fillRef>
+          <a:effectRef idx="0">
+            <a:schemeClr val="accent1"/>
+          </a:effectRef>
+          <a:fontRef idx="minor">
+            <a:schemeClr val="lt1"/>
+          </a:fontRef>
+        </p:style>
+        <p:txBody>
+          <a:bodyPr rtlCol="0" anchor="ctr"/>
+          <a:lstStyle/>
+          <a:p>
+            <a:pPr algn="ctr"/>
+            <a:endParaRPr lang="en-SG" dirty="0"/>
+          </a:p>
+        </p:txBody>
+      </p:sp>
+      <p:sp>
+        <p:nvSpPr>
+          <p:cNvPr id="7" name="TextBox 6">
+            <a:extLst>
+              <a:ext uri="{FF2B5EF4-FFF2-40B4-BE49-F238E27FC236}">
+                <a16:creationId xmlns:a16="http://schemas.microsoft.com/office/drawing/2014/main" id="{C6626677-796B-43F5-910B-52DCC2213E17}"/>
+              </a:ext>
+            </a:extLst>
+          </p:cNvPr>
+          <p:cNvSpPr txBox="1"/>
+          <p:nvPr/>
+        </p:nvSpPr>
+        <p:spPr>
+          <a:xfrm>
+            <a:off x="4396809" y="3835643"/>
+            <a:ext cx="475579" cy="338554"/>
+          </a:xfrm>
+          <a:prstGeom prst="rect">
+            <a:avLst/>
+          </a:prstGeom>
+          <a:noFill/>
+        </p:spPr>
+        <p:txBody>
+          <a:bodyPr wrap="none" rtlCol="0">
+            <a:spAutoFit/>
+          </a:bodyPr>
+          <a:lstStyle/>
+          <a:p>
+            <a:r>
+              <a:rPr lang="en-SG" sz="1600" b="1" dirty="0"/>
+              <a:t>opt</a:t>
+            </a:r>
+          </a:p>
+        </p:txBody>
+      </p:sp>
     </p:spTree>
     <p:extLst>
       <p:ext uri="{BB962C8B-B14F-4D97-AF65-F5344CB8AC3E}">

</xml_diff>